<commit_message>
Update 07 EDABDC - Big Data Tools.pptx
</commit_message>
<xml_diff>
--- a/materials/PPT slides/07 EDABDC - Big Data Tools.pptx
+++ b/materials/PPT slides/07 EDABDC - Big Data Tools.pptx
@@ -5,7 +5,7 @@
     <p:sldMasterId id="2147483648" r:id="rId1"/>
   </p:sldMasterIdLst>
   <p:notesMasterIdLst>
-    <p:notesMasterId r:id="rId14"/>
+    <p:notesMasterId r:id="rId15"/>
   </p:notesMasterIdLst>
   <p:sldIdLst>
     <p:sldId id="256" r:id="rId3"/>
@@ -18,7 +18,8 @@
     <p:sldId id="321" r:id="rId10"/>
     <p:sldId id="322" r:id="rId11"/>
     <p:sldId id="323" r:id="rId12"/>
-    <p:sldId id="314" r:id="rId13"/>
+    <p:sldId id="325" r:id="rId13"/>
+    <p:sldId id="314" r:id="rId14"/>
   </p:sldIdLst>
   <p:sldSz cx="12192000" cy="6858000"/>
   <p:notesSz cx="6858000" cy="9144000"/>
@@ -3524,6 +3525,82 @@
         <p:txBody>
           <a:bodyPr/>
           <a:p>
+            <a:endParaRPr lang="en-GB" altLang="en-US"/>
+          </a:p>
+        </p:txBody>
+      </p:sp>
+      <p:sp>
+        <p:nvSpPr>
+          <p:cNvPr id="3" name="Content Placeholder 2"/>
+          <p:cNvSpPr>
+            <a:spLocks noGrp="1"/>
+          </p:cNvSpPr>
+          <p:nvPr>
+            <p:ph idx="1"/>
+          </p:nvPr>
+        </p:nvSpPr>
+        <p:spPr/>
+        <p:txBody>
+          <a:bodyPr/>
+          <a:p>
+            <a:endParaRPr lang="en-GB" altLang="en-US"/>
+          </a:p>
+        </p:txBody>
+      </p:sp>
+      <p:pic>
+        <p:nvPicPr>
+          <p:cNvPr id="4" name="Picture 3"/>
+          <p:cNvPicPr/>
+          <p:nvPr/>
+        </p:nvPicPr>
+        <p:blipFill>
+          <a:blip r:embed="rId1"/>
+          <a:stretch>
+            <a:fillRect/>
+          </a:stretch>
+        </p:blipFill>
+        <p:spPr>
+          <a:xfrm>
+            <a:off x="186690" y="163830"/>
+            <a:ext cx="12005310" cy="6503670"/>
+          </a:xfrm>
+          <a:prstGeom prst="rect">
+            <a:avLst/>
+          </a:prstGeom>
+        </p:spPr>
+      </p:pic>
+    </p:spTree>
+  </p:cSld>
+  <p:clrMapOvr>
+    <a:masterClrMapping/>
+  </p:clrMapOvr>
+</p:sld>
+</file>
+
+<file path=ppt/slides/slide12.xml><?xml version="1.0" encoding="utf-8"?>
+<p:sld xmlns:a="http://schemas.openxmlformats.org/drawingml/2006/main" xmlns:r="http://schemas.openxmlformats.org/officeDocument/2006/relationships" xmlns:p="http://schemas.openxmlformats.org/presentationml/2006/main">
+  <p:cSld>
+    <p:spTree>
+      <p:nvGrpSpPr>
+        <p:cNvPr id="1" name=""/>
+        <p:cNvGrpSpPr/>
+        <p:nvPr/>
+      </p:nvGrpSpPr>
+      <p:grpSpPr/>
+      <p:sp>
+        <p:nvSpPr>
+          <p:cNvPr id="2" name="Title 1"/>
+          <p:cNvSpPr>
+            <a:spLocks noGrp="1"/>
+          </p:cNvSpPr>
+          <p:nvPr>
+            <p:ph type="title"/>
+          </p:nvPr>
+        </p:nvSpPr>
+        <p:spPr/>
+        <p:txBody>
+          <a:bodyPr/>
+          <a:p>
             <a:r>
               <a:rPr lang="en-US"/>
               <a:t>Questions </a:t>
@@ -3763,6 +3840,52 @@
           </a:p>
         </p:txBody>
       </p:sp>
+      <p:pic>
+        <p:nvPicPr>
+          <p:cNvPr id="4" name="Picture 3"/>
+          <p:cNvPicPr>
+            <a:picLocks noChangeAspect="1"/>
+          </p:cNvPicPr>
+          <p:nvPr/>
+        </p:nvPicPr>
+        <p:blipFill>
+          <a:blip r:embed="rId1"/>
+          <a:stretch>
+            <a:fillRect/>
+          </a:stretch>
+        </p:blipFill>
+        <p:spPr>
+          <a:xfrm>
+            <a:off x="838200" y="4687570"/>
+            <a:ext cx="2849245" cy="1865630"/>
+          </a:xfrm>
+          <a:prstGeom prst="rect">
+            <a:avLst/>
+          </a:prstGeom>
+        </p:spPr>
+      </p:pic>
+      <p:pic>
+        <p:nvPicPr>
+          <p:cNvPr id="5" name="Picture 4"/>
+          <p:cNvPicPr/>
+          <p:nvPr/>
+        </p:nvPicPr>
+        <p:blipFill>
+          <a:blip r:embed="rId2"/>
+          <a:stretch>
+            <a:fillRect/>
+          </a:stretch>
+        </p:blipFill>
+        <p:spPr>
+          <a:xfrm>
+            <a:off x="5105400" y="4750435"/>
+            <a:ext cx="3765550" cy="1802765"/>
+          </a:xfrm>
+          <a:prstGeom prst="rect">
+            <a:avLst/>
+          </a:prstGeom>
+        </p:spPr>
+      </p:pic>
     </p:spTree>
   </p:cSld>
   <p:clrMapOvr>
@@ -3929,6 +4052,51 @@
           </a:p>
         </p:txBody>
       </p:sp>
+      <p:pic>
+        <p:nvPicPr>
+          <p:cNvPr id="4" name="Picture 3"/>
+          <p:cNvPicPr/>
+          <p:nvPr/>
+        </p:nvPicPr>
+        <p:blipFill>
+          <a:blip r:embed="rId1"/>
+          <a:stretch>
+            <a:fillRect/>
+          </a:stretch>
+        </p:blipFill>
+        <p:spPr>
+          <a:xfrm>
+            <a:off x="838200" y="4022090"/>
+            <a:ext cx="2385060" cy="2614930"/>
+          </a:xfrm>
+          <a:prstGeom prst="rect">
+            <a:avLst/>
+          </a:prstGeom>
+        </p:spPr>
+      </p:pic>
+      <p:pic>
+        <p:nvPicPr>
+          <p:cNvPr id="5" name="Picture 4"/>
+          <p:cNvPicPr/>
+          <p:nvPr/>
+        </p:nvPicPr>
+        <p:blipFill>
+          <a:blip r:embed="rId2"/>
+          <a:srcRect l="28000" r="36193"/>
+          <a:stretch>
+            <a:fillRect/>
+          </a:stretch>
+        </p:blipFill>
+        <p:spPr>
+          <a:xfrm>
+            <a:off x="8683625" y="3509645"/>
+            <a:ext cx="3129280" cy="3064510"/>
+          </a:xfrm>
+          <a:prstGeom prst="rect">
+            <a:avLst/>
+          </a:prstGeom>
+        </p:spPr>
+      </p:pic>
     </p:spTree>
   </p:cSld>
   <p:clrMapOvr>
@@ -4012,6 +4180,28 @@
           </a:p>
         </p:txBody>
       </p:sp>
+      <p:pic>
+        <p:nvPicPr>
+          <p:cNvPr id="4" name="Picture 3"/>
+          <p:cNvPicPr/>
+          <p:nvPr/>
+        </p:nvPicPr>
+        <p:blipFill>
+          <a:blip r:embed="rId1"/>
+          <a:stretch>
+            <a:fillRect/>
+          </a:stretch>
+        </p:blipFill>
+        <p:spPr>
+          <a:xfrm>
+            <a:off x="1511300" y="4204335"/>
+            <a:ext cx="8502015" cy="1844040"/>
+          </a:xfrm>
+          <a:prstGeom prst="rect">
+            <a:avLst/>
+          </a:prstGeom>
+        </p:spPr>
+      </p:pic>
     </p:spTree>
   </p:cSld>
   <p:clrMapOvr>
@@ -4095,6 +4285,28 @@
           </a:p>
         </p:txBody>
       </p:sp>
+      <p:pic>
+        <p:nvPicPr>
+          <p:cNvPr id="4" name="Picture 3"/>
+          <p:cNvPicPr/>
+          <p:nvPr/>
+        </p:nvPicPr>
+        <p:blipFill>
+          <a:blip r:embed="rId1"/>
+          <a:stretch>
+            <a:fillRect/>
+          </a:stretch>
+        </p:blipFill>
+        <p:spPr>
+          <a:xfrm>
+            <a:off x="5175250" y="4203065"/>
+            <a:ext cx="3763645" cy="2405380"/>
+          </a:xfrm>
+          <a:prstGeom prst="rect">
+            <a:avLst/>
+          </a:prstGeom>
+        </p:spPr>
+      </p:pic>
     </p:spTree>
   </p:cSld>
   <p:clrMapOvr>

</xml_diff>